<commit_message>
Message préparé lors de l'obtention des utilisateurs, pas d'affichage de password
</commit_message>
<xml_diff>
--- a/Infos/X-Web_shop-Presentation-darchasi.pptx
+++ b/Infos/X-Web_shop-Presentation-darchasi.pptx
@@ -6,14 +6,14 @@
   </p:sldMasterIdLst>
   <p:sldIdLst>
     <p:sldId id="256" r:id="rId2"/>
-    <p:sldId id="257" r:id="rId3"/>
-    <p:sldId id="258" r:id="rId4"/>
-    <p:sldId id="259" r:id="rId5"/>
-    <p:sldId id="260" r:id="rId6"/>
-    <p:sldId id="262" r:id="rId7"/>
-    <p:sldId id="263" r:id="rId8"/>
-    <p:sldId id="264" r:id="rId9"/>
-    <p:sldId id="265" r:id="rId10"/>
+    <p:sldId id="268" r:id="rId3"/>
+    <p:sldId id="257" r:id="rId4"/>
+    <p:sldId id="260" r:id="rId5"/>
+    <p:sldId id="258" r:id="rId6"/>
+    <p:sldId id="259" r:id="rId7"/>
+    <p:sldId id="262" r:id="rId8"/>
+    <p:sldId id="265" r:id="rId9"/>
+    <p:sldId id="263" r:id="rId10"/>
     <p:sldId id="266" r:id="rId11"/>
     <p:sldId id="267" r:id="rId12"/>
   </p:sldIdLst>
@@ -114,6 +114,11 @@
       </a:defRPr>
     </a:lvl9pPr>
   </p:defaultTextStyle>
+  <p:extLst>
+    <p:ext uri="{EFAFB233-063F-42B5-8137-9DF3F51BA10A}">
+      <p15:sldGuideLst xmlns:p15="http://schemas.microsoft.com/office/powerpoint/2012/main"/>
+    </p:ext>
+  </p:extLst>
 </p:presentation>
 </file>
 
@@ -248,7 +253,7 @@
           <a:p>
             <a:fld id="{AC2F2F6C-815A-4F00-9BAB-9C7EA03CA012}" type="datetimeFigureOut">
               <a:rPr lang="fr-CH" smtClean="0"/>
-              <a:t>26.05.2024</a:t>
+              <a:t>29.05.2024</a:t>
             </a:fld>
             <a:endParaRPr lang="fr-CH"/>
           </a:p>
@@ -418,7 +423,7 @@
           <a:p>
             <a:fld id="{AC2F2F6C-815A-4F00-9BAB-9C7EA03CA012}" type="datetimeFigureOut">
               <a:rPr lang="fr-CH" smtClean="0"/>
-              <a:t>26.05.2024</a:t>
+              <a:t>29.05.2024</a:t>
             </a:fld>
             <a:endParaRPr lang="fr-CH"/>
           </a:p>
@@ -598,7 +603,7 @@
           <a:p>
             <a:fld id="{AC2F2F6C-815A-4F00-9BAB-9C7EA03CA012}" type="datetimeFigureOut">
               <a:rPr lang="fr-CH" smtClean="0"/>
-              <a:t>26.05.2024</a:t>
+              <a:t>29.05.2024</a:t>
             </a:fld>
             <a:endParaRPr lang="fr-CH"/>
           </a:p>
@@ -768,7 +773,7 @@
           <a:p>
             <a:fld id="{AC2F2F6C-815A-4F00-9BAB-9C7EA03CA012}" type="datetimeFigureOut">
               <a:rPr lang="fr-CH" smtClean="0"/>
-              <a:t>26.05.2024</a:t>
+              <a:t>29.05.2024</a:t>
             </a:fld>
             <a:endParaRPr lang="fr-CH"/>
           </a:p>
@@ -1014,7 +1019,7 @@
           <a:p>
             <a:fld id="{AC2F2F6C-815A-4F00-9BAB-9C7EA03CA012}" type="datetimeFigureOut">
               <a:rPr lang="fr-CH" smtClean="0"/>
-              <a:t>26.05.2024</a:t>
+              <a:t>29.05.2024</a:t>
             </a:fld>
             <a:endParaRPr lang="fr-CH"/>
           </a:p>
@@ -1246,7 +1251,7 @@
           <a:p>
             <a:fld id="{AC2F2F6C-815A-4F00-9BAB-9C7EA03CA012}" type="datetimeFigureOut">
               <a:rPr lang="fr-CH" smtClean="0"/>
-              <a:t>26.05.2024</a:t>
+              <a:t>29.05.2024</a:t>
             </a:fld>
             <a:endParaRPr lang="fr-CH"/>
           </a:p>
@@ -1613,7 +1618,7 @@
           <a:p>
             <a:fld id="{AC2F2F6C-815A-4F00-9BAB-9C7EA03CA012}" type="datetimeFigureOut">
               <a:rPr lang="fr-CH" smtClean="0"/>
-              <a:t>26.05.2024</a:t>
+              <a:t>29.05.2024</a:t>
             </a:fld>
             <a:endParaRPr lang="fr-CH"/>
           </a:p>
@@ -1731,7 +1736,7 @@
           <a:p>
             <a:fld id="{AC2F2F6C-815A-4F00-9BAB-9C7EA03CA012}" type="datetimeFigureOut">
               <a:rPr lang="fr-CH" smtClean="0"/>
-              <a:t>26.05.2024</a:t>
+              <a:t>29.05.2024</a:t>
             </a:fld>
             <a:endParaRPr lang="fr-CH"/>
           </a:p>
@@ -1826,7 +1831,7 @@
           <a:p>
             <a:fld id="{AC2F2F6C-815A-4F00-9BAB-9C7EA03CA012}" type="datetimeFigureOut">
               <a:rPr lang="fr-CH" smtClean="0"/>
-              <a:t>26.05.2024</a:t>
+              <a:t>29.05.2024</a:t>
             </a:fld>
             <a:endParaRPr lang="fr-CH"/>
           </a:p>
@@ -2103,7 +2108,7 @@
           <a:p>
             <a:fld id="{AC2F2F6C-815A-4F00-9BAB-9C7EA03CA012}" type="datetimeFigureOut">
               <a:rPr lang="fr-CH" smtClean="0"/>
-              <a:t>26.05.2024</a:t>
+              <a:t>29.05.2024</a:t>
             </a:fld>
             <a:endParaRPr lang="fr-CH"/>
           </a:p>
@@ -2360,7 +2365,7 @@
           <a:p>
             <a:fld id="{AC2F2F6C-815A-4F00-9BAB-9C7EA03CA012}" type="datetimeFigureOut">
               <a:rPr lang="fr-CH" smtClean="0"/>
-              <a:t>26.05.2024</a:t>
+              <a:t>29.05.2024</a:t>
             </a:fld>
             <a:endParaRPr lang="fr-CH"/>
           </a:p>
@@ -2573,7 +2578,7 @@
           <a:p>
             <a:fld id="{AC2F2F6C-815A-4F00-9BAB-9C7EA03CA012}" type="datetimeFigureOut">
               <a:rPr lang="fr-CH" smtClean="0"/>
-              <a:t>26.05.2024</a:t>
+              <a:t>29.05.2024</a:t>
             </a:fld>
             <a:endParaRPr lang="fr-CH"/>
           </a:p>
@@ -3797,12 +3802,72 @@
           <a:chExt cx="0" cy="0"/>
         </a:xfrm>
       </p:grpSpPr>
+      <p:sp useBgFill="1">
+        <p:nvSpPr>
+          <p:cNvPr id="9" name="Slide Background">
+            <a:extLst>
+              <a:ext uri="{FF2B5EF4-FFF2-40B4-BE49-F238E27FC236}">
+                <a16:creationId xmlns:a16="http://schemas.microsoft.com/office/drawing/2014/main" id="{9F7D5CDA-D291-4307-BF55-1381FED29634}"/>
+              </a:ext>
+              <a:ext uri="{C183D7F6-B498-43B3-948B-1728B52AA6E4}">
+                <adec:decorative xmlns:adec="http://schemas.microsoft.com/office/drawing/2017/decorative" val="1"/>
+              </a:ext>
+            </a:extLst>
+          </p:cNvPr>
+          <p:cNvSpPr>
+            <a:spLocks noGrp="1" noRot="1" noChangeAspect="1" noMove="1" noResize="1" noEditPoints="1" noAdjustHandles="1" noChangeArrowheads="1" noChangeShapeType="1" noTextEdit="1"/>
+          </p:cNvSpPr>
+          <p:nvPr>
+            <p:extLst>
+              <p:ext uri="{386F3935-93C4-4BCD-93E2-E3B085C9AB24}">
+                <p16:designElem xmlns:p16="http://schemas.microsoft.com/office/powerpoint/2015/main" val="1"/>
+              </p:ext>
+            </p:extLst>
+          </p:nvPr>
+        </p:nvSpPr>
+        <p:spPr>
+          <a:xfrm>
+            <a:off x="0" y="0"/>
+            <a:ext cx="12192000" cy="6858000"/>
+          </a:xfrm>
+          <a:prstGeom prst="rect">
+            <a:avLst/>
+          </a:prstGeom>
+          <a:ln>
+            <a:noFill/>
+          </a:ln>
+        </p:spPr>
+        <p:style>
+          <a:lnRef idx="2">
+            <a:schemeClr val="accent1">
+              <a:shade val="50000"/>
+            </a:schemeClr>
+          </a:lnRef>
+          <a:fillRef idx="1">
+            <a:schemeClr val="accent1"/>
+          </a:fillRef>
+          <a:effectRef idx="0">
+            <a:schemeClr val="accent1"/>
+          </a:effectRef>
+          <a:fontRef idx="minor">
+            <a:schemeClr val="lt1"/>
+          </a:fontRef>
+        </p:style>
+        <p:txBody>
+          <a:bodyPr rtlCol="0" anchor="ctr"/>
+          <a:lstStyle/>
+          <a:p>
+            <a:pPr algn="ctr"/>
+            <a:endParaRPr lang="en-US"/>
+          </a:p>
+        </p:txBody>
+      </p:sp>
       <p:sp>
         <p:nvSpPr>
           <p:cNvPr id="2" name="Titre 1">
             <a:extLst>
               <a:ext uri="{FF2B5EF4-FFF2-40B4-BE49-F238E27FC236}">
-                <a16:creationId xmlns:a16="http://schemas.microsoft.com/office/drawing/2014/main" id="{52669203-B554-E42C-AB81-ACBAD4101720}"/>
+                <a16:creationId xmlns:a16="http://schemas.microsoft.com/office/drawing/2014/main" id="{D036FC65-AF9D-965F-53DF-E8B4471B1DEF}"/>
               </a:ext>
             </a:extLst>
           </p:cNvPr>
@@ -3815,33 +3880,109 @@
         </p:nvSpPr>
         <p:spPr>
           <a:xfrm>
-            <a:off x="838200" y="1641752"/>
-            <a:ext cx="4391025" cy="1323439"/>
-          </a:xfrm>
-        </p:spPr>
-        <p:txBody>
-          <a:bodyPr anchor="t">
+            <a:off x="761800" y="762001"/>
+            <a:ext cx="5334197" cy="1708242"/>
+          </a:xfrm>
+        </p:spPr>
+        <p:txBody>
+          <a:bodyPr anchor="ctr">
             <a:normAutofit/>
           </a:bodyPr>
           <a:lstStyle/>
           <a:p>
             <a:r>
-              <a:rPr lang="fr-CH" sz="4000" dirty="0">
-                <a:solidFill>
-                  <a:schemeClr val="tx1"/>
-                </a:solidFill>
-              </a:rPr>
-              <a:t>Packages</a:t>
-            </a:r>
+              <a:rPr lang="fr-CH" sz="4000"/>
+              <a:t>INDEX</a:t>
+            </a:r>
+          </a:p>
+        </p:txBody>
+      </p:sp>
+      <p:sp>
+        <p:nvSpPr>
+          <p:cNvPr id="3" name="Espace réservé du contenu 2">
+            <a:extLst>
+              <a:ext uri="{FF2B5EF4-FFF2-40B4-BE49-F238E27FC236}">
+                <a16:creationId xmlns:a16="http://schemas.microsoft.com/office/drawing/2014/main" id="{584A1386-DF77-105F-7F01-0678E7CAE432}"/>
+              </a:ext>
+            </a:extLst>
+          </p:cNvPr>
+          <p:cNvSpPr>
+            <a:spLocks noGrp="1"/>
+          </p:cNvSpPr>
+          <p:nvPr>
+            <p:ph idx="1"/>
+          </p:nvPr>
+        </p:nvSpPr>
+        <p:spPr>
+          <a:xfrm>
+            <a:off x="761800" y="2470244"/>
+            <a:ext cx="5334197" cy="3769835"/>
+          </a:xfrm>
+        </p:spPr>
+        <p:txBody>
+          <a:bodyPr anchor="ctr">
+            <a:normAutofit/>
+          </a:bodyPr>
+          <a:lstStyle/>
+          <a:p>
+            <a:r>
+              <a:rPr lang="fr-CH" sz="2000"/>
+              <a:t>PACKAGES</a:t>
+            </a:r>
+          </a:p>
+          <a:p>
+            <a:r>
+              <a:rPr lang="fr-CH" sz="2000"/>
+              <a:t>MODÈLES</a:t>
+            </a:r>
+          </a:p>
+          <a:p>
+            <a:r>
+              <a:rPr lang="fr-CH" sz="2000"/>
+              <a:t>AUTHENTIFICATION</a:t>
+            </a:r>
+          </a:p>
+          <a:p>
+            <a:r>
+              <a:rPr lang="fr-CH" sz="2000"/>
+              <a:t>HTTPS</a:t>
+            </a:r>
+          </a:p>
+          <a:p>
+            <a:r>
+              <a:rPr lang="fr-CH" sz="2000"/>
+              <a:t>INSERTION DONNÉES DB</a:t>
+            </a:r>
+          </a:p>
+          <a:p>
+            <a:r>
+              <a:rPr lang="fr-CH" sz="2000"/>
+              <a:t>ROUTES</a:t>
+            </a:r>
+          </a:p>
+          <a:p>
+            <a:r>
+              <a:rPr lang="fr-CH" sz="2000"/>
+              <a:t>CONTRÔLEURS</a:t>
+            </a:r>
+          </a:p>
+          <a:p>
+            <a:r>
+              <a:rPr lang="fr-CH" sz="2000"/>
+              <a:t>VUE</a:t>
+            </a:r>
+          </a:p>
+          <a:p>
+            <a:endParaRPr lang="fr-CH" sz="2000"/>
           </a:p>
         </p:txBody>
       </p:sp>
       <p:pic>
         <p:nvPicPr>
-          <p:cNvPr id="7" name="Image 6">
+          <p:cNvPr id="5" name="Picture 4" descr="Verrou sur la carte mère de l’ordinateur">
             <a:extLst>
               <a:ext uri="{FF2B5EF4-FFF2-40B4-BE49-F238E27FC236}">
-                <a16:creationId xmlns:a16="http://schemas.microsoft.com/office/drawing/2014/main" id="{5CBBC4C2-0676-2FA8-EA1D-D229D2770BB2}"/>
+                <a16:creationId xmlns:a16="http://schemas.microsoft.com/office/drawing/2014/main" id="{4AF4420C-B17D-F04C-0CE1-6C3D440F5692}"/>
               </a:ext>
             </a:extLst>
           </p:cNvPr>
@@ -3850,26 +3991,32 @@
           </p:cNvPicPr>
           <p:nvPr/>
         </p:nvPicPr>
-        <p:blipFill>
+        <p:blipFill rotWithShape="1">
           <a:blip r:embed="rId2"/>
-          <a:stretch>
-            <a:fillRect/>
-          </a:stretch>
+          <a:srcRect l="12405" r="35759" b="-1"/>
+          <a:stretch/>
         </p:blipFill>
         <p:spPr>
           <a:xfrm>
-            <a:off x="6182949" y="1429488"/>
-            <a:ext cx="5087076" cy="3960000"/>
+            <a:off x="6857797" y="-10886"/>
+            <a:ext cx="5334204" cy="6868886"/>
           </a:xfrm>
           <a:prstGeom prst="rect">
             <a:avLst/>
           </a:prstGeom>
+          <a:effectLst>
+            <a:outerShdw blurRad="127000" dist="50800" dir="10800000" sx="99000" sy="99000" algn="r" rotWithShape="0">
+              <a:prstClr val="black">
+                <a:alpha val="40000"/>
+              </a:prstClr>
+            </a:outerShdw>
+          </a:effectLst>
         </p:spPr>
       </p:pic>
     </p:spTree>
     <p:extLst>
       <p:ext uri="{BB962C8B-B14F-4D97-AF65-F5344CB8AC3E}">
-        <p14:creationId xmlns:p14="http://schemas.microsoft.com/office/powerpoint/2010/main" val="565384309"/>
+        <p14:creationId xmlns:p14="http://schemas.microsoft.com/office/powerpoint/2010/main" val="52006877"/>
       </p:ext>
     </p:extLst>
   </p:cSld>
@@ -3909,7 +4056,7 @@
           <p:cNvPr id="2" name="Titre 1">
             <a:extLst>
               <a:ext uri="{FF2B5EF4-FFF2-40B4-BE49-F238E27FC236}">
-                <a16:creationId xmlns:a16="http://schemas.microsoft.com/office/drawing/2014/main" id="{1226748C-410A-1879-5299-BC3F19D6B205}"/>
+                <a16:creationId xmlns:a16="http://schemas.microsoft.com/office/drawing/2014/main" id="{52669203-B554-E42C-AB81-ACBAD4101720}"/>
               </a:ext>
             </a:extLst>
           </p:cNvPr>
@@ -3922,33 +4069,33 @@
         </p:nvSpPr>
         <p:spPr>
           <a:xfrm>
-            <a:off x="1295400" y="669925"/>
-            <a:ext cx="4800600" cy="1325563"/>
-          </a:xfrm>
-        </p:spPr>
-        <p:txBody>
-          <a:bodyPr vert="horz" lIns="91440" tIns="45720" rIns="91440" bIns="45720" rtlCol="0" anchor="b">
+            <a:off x="838200" y="1641752"/>
+            <a:ext cx="4391025" cy="1323439"/>
+          </a:xfrm>
+        </p:spPr>
+        <p:txBody>
+          <a:bodyPr anchor="t">
             <a:normAutofit/>
           </a:bodyPr>
           <a:lstStyle/>
           <a:p>
             <a:r>
-              <a:rPr lang="fr-CH" dirty="0">
+              <a:rPr lang="fr-CH" sz="4000" dirty="0">
                 <a:solidFill>
                   <a:schemeClr val="tx1"/>
                 </a:solidFill>
               </a:rPr>
-              <a:t>Authentification</a:t>
+              <a:t>Packages</a:t>
             </a:r>
           </a:p>
         </p:txBody>
       </p:sp>
       <p:pic>
         <p:nvPicPr>
-          <p:cNvPr id="5" name="Image 4" descr="Une image contenant texte, capture d’écran, logiciel, affichage&#10;&#10;Description générée automatiquement">
+          <p:cNvPr id="7" name="Image 6">
             <a:extLst>
               <a:ext uri="{FF2B5EF4-FFF2-40B4-BE49-F238E27FC236}">
-                <a16:creationId xmlns:a16="http://schemas.microsoft.com/office/drawing/2014/main" id="{9456160A-714B-02CE-D34F-9ED8A372ED8D}"/>
+                <a16:creationId xmlns:a16="http://schemas.microsoft.com/office/drawing/2014/main" id="{5CBBC4C2-0676-2FA8-EA1D-D229D2770BB2}"/>
               </a:ext>
             </a:extLst>
           </p:cNvPr>
@@ -3965,83 +4112,18 @@
         </p:blipFill>
         <p:spPr>
           <a:xfrm>
-            <a:off x="6096000" y="2775598"/>
-            <a:ext cx="5934743" cy="3412477"/>
+            <a:off x="6182949" y="1429488"/>
+            <a:ext cx="5087076" cy="3960000"/>
           </a:xfrm>
           <a:prstGeom prst="rect">
             <a:avLst/>
           </a:prstGeom>
         </p:spPr>
       </p:pic>
-      <p:pic>
-        <p:nvPicPr>
-          <p:cNvPr id="4" name="Espace réservé du contenu 3" descr="Une image contenant texte, Appareils électroniques, capture d’écran, affichage&#10;&#10;Description générée automatiquement">
-            <a:extLst>
-              <a:ext uri="{FF2B5EF4-FFF2-40B4-BE49-F238E27FC236}">
-                <a16:creationId xmlns:a16="http://schemas.microsoft.com/office/drawing/2014/main" id="{29D79410-D231-94F0-E8E2-24DA72D8CF91}"/>
-              </a:ext>
-            </a:extLst>
-          </p:cNvPr>
-          <p:cNvPicPr>
-            <a:picLocks noChangeAspect="1"/>
-          </p:cNvPicPr>
-          <p:nvPr/>
-        </p:nvPicPr>
-        <p:blipFill>
-          <a:blip r:embed="rId3"/>
-          <a:stretch>
-            <a:fillRect/>
-          </a:stretch>
-        </p:blipFill>
-        <p:spPr>
-          <a:xfrm>
-            <a:off x="489847" y="2221405"/>
-            <a:ext cx="5321018" cy="3950857"/>
-          </a:xfrm>
-          <a:prstGeom prst="rect">
-            <a:avLst/>
-          </a:prstGeom>
-        </p:spPr>
-      </p:pic>
-      <p:sp>
-        <p:nvSpPr>
-          <p:cNvPr id="7" name="ZoneTexte 6">
-            <a:extLst>
-              <a:ext uri="{FF2B5EF4-FFF2-40B4-BE49-F238E27FC236}">
-                <a16:creationId xmlns:a16="http://schemas.microsoft.com/office/drawing/2014/main" id="{426B8190-3B86-F67A-AF9C-371E4109AB9C}"/>
-              </a:ext>
-            </a:extLst>
-          </p:cNvPr>
-          <p:cNvSpPr txBox="1"/>
-          <p:nvPr/>
-        </p:nvSpPr>
-        <p:spPr>
-          <a:xfrm>
-            <a:off x="8547990" y="2377998"/>
-            <a:ext cx="873957" cy="369332"/>
-          </a:xfrm>
-          <a:prstGeom prst="rect">
-            <a:avLst/>
-          </a:prstGeom>
-          <a:noFill/>
-        </p:spPr>
-        <p:txBody>
-          <a:bodyPr wrap="none" rtlCol="0">
-            <a:spAutoFit/>
-          </a:bodyPr>
-          <a:lstStyle/>
-          <a:p>
-            <a:r>
-              <a:rPr lang="fr-CH" dirty="0"/>
-              <a:t>Admin</a:t>
-            </a:r>
-          </a:p>
-        </p:txBody>
-      </p:sp>
     </p:spTree>
     <p:extLst>
       <p:ext uri="{BB962C8B-B14F-4D97-AF65-F5344CB8AC3E}">
-        <p14:creationId xmlns:p14="http://schemas.microsoft.com/office/powerpoint/2010/main" val="2248539204"/>
+        <p14:creationId xmlns:p14="http://schemas.microsoft.com/office/powerpoint/2010/main" val="565384309"/>
       </p:ext>
     </p:extLst>
   </p:cSld>
@@ -4081,7 +4163,7 @@
           <p:cNvPr id="2" name="Titre 1">
             <a:extLst>
               <a:ext uri="{FF2B5EF4-FFF2-40B4-BE49-F238E27FC236}">
-                <a16:creationId xmlns:a16="http://schemas.microsoft.com/office/drawing/2014/main" id="{2B3F0FC3-0F62-A078-0F24-72F4F5D94885}"/>
+                <a16:creationId xmlns:a16="http://schemas.microsoft.com/office/drawing/2014/main" id="{651FBEEA-EC75-AF80-35CD-FEE3CEF2043F}"/>
               </a:ext>
             </a:extLst>
           </p:cNvPr>
@@ -4094,208 +4176,139 @@
         </p:nvSpPr>
         <p:spPr>
           <a:xfrm>
-            <a:off x="6981823" y="1641752"/>
-            <a:ext cx="4391025" cy="1323439"/>
-          </a:xfrm>
-        </p:spPr>
-        <p:txBody>
-          <a:bodyPr vert="horz" lIns="91440" tIns="45720" rIns="91440" bIns="45720" rtlCol="0" anchor="t">
+            <a:off x="7639052" y="734140"/>
+            <a:ext cx="3943436" cy="712522"/>
+          </a:xfrm>
+        </p:spPr>
+        <p:txBody>
+          <a:bodyPr anchor="b">
             <a:normAutofit/>
           </a:bodyPr>
           <a:lstStyle/>
           <a:p>
             <a:r>
-              <a:rPr lang="en-US" sz="4000" kern="1200" dirty="0">
+              <a:rPr lang="fr-CH" dirty="0">
                 <a:solidFill>
                   <a:schemeClr val="tx1"/>
                 </a:solidFill>
-                <a:latin typeface="+mj-lt"/>
-                <a:ea typeface="+mj-ea"/>
-                <a:cs typeface="+mj-cs"/>
               </a:rPr>
-              <a:t>HTTPS</a:t>
+              <a:t>Modèle</a:t>
             </a:r>
           </a:p>
         </p:txBody>
       </p:sp>
       <p:pic>
         <p:nvPicPr>
-          <p:cNvPr id="4" name="Espace réservé du contenu 3" descr="Une image contenant texte, capture d’écran, logiciel, affichage&#10;&#10;Description générée automatiquement">
+          <p:cNvPr id="5" name="Image 4" descr="Une image contenant texte, capture d’écran, logiciel, Police&#10;&#10;Description générée automatiquement">
             <a:extLst>
               <a:ext uri="{FF2B5EF4-FFF2-40B4-BE49-F238E27FC236}">
-                <a16:creationId xmlns:a16="http://schemas.microsoft.com/office/drawing/2014/main" id="{16387574-9D8D-C9B3-B017-C3A00ABDEEB9}"/>
+                <a16:creationId xmlns:a16="http://schemas.microsoft.com/office/drawing/2014/main" id="{86B6D739-AC81-4103-06DA-605FCA9A8F3B}"/>
               </a:ext>
             </a:extLst>
           </p:cNvPr>
           <p:cNvPicPr>
-            <a:picLocks noGrp="1" noChangeAspect="1"/>
+            <a:picLocks noChangeAspect="1"/>
           </p:cNvPicPr>
-          <p:nvPr>
-            <p:ph idx="1"/>
-          </p:nvPr>
+          <p:nvPr/>
         </p:nvPicPr>
         <p:blipFill>
-          <a:blip r:embed="rId2"/>
+          <a:blip r:embed="rId2">
+            <a:extLst>
+              <a:ext uri="{28A0092B-C50C-407E-A947-70E740481C1C}">
+                <a14:useLocalDpi xmlns:a14="http://schemas.microsoft.com/office/drawing/2010/main" val="0"/>
+              </a:ext>
+            </a:extLst>
+          </a:blip>
           <a:stretch>
             <a:fillRect/>
           </a:stretch>
         </p:blipFill>
         <p:spPr>
           <a:xfrm>
-            <a:off x="514839" y="1966451"/>
-            <a:ext cx="5952145" cy="3422483"/>
+            <a:off x="5139703" y="2190749"/>
+            <a:ext cx="1712612" cy="4253909"/>
           </a:xfrm>
           <a:prstGeom prst="rect">
             <a:avLst/>
           </a:prstGeom>
         </p:spPr>
       </p:pic>
-      <p:sp>
-        <p:nvSpPr>
-          <p:cNvPr id="5" name="ZoneTexte 4">
+      <p:pic>
+        <p:nvPicPr>
+          <p:cNvPr id="4" name="Espace réservé du contenu 3" descr="Une image contenant texte, capture d’écran&#10;&#10;Description générée automatiquement">
             <a:extLst>
               <a:ext uri="{FF2B5EF4-FFF2-40B4-BE49-F238E27FC236}">
-                <a16:creationId xmlns:a16="http://schemas.microsoft.com/office/drawing/2014/main" id="{833B5714-644F-E26D-6522-5D9CC92E16EC}"/>
+                <a16:creationId xmlns:a16="http://schemas.microsoft.com/office/drawing/2014/main" id="{47DEA8A8-69BD-DCCE-2EBF-B4B72BDEF8BE}"/>
               </a:ext>
             </a:extLst>
           </p:cNvPr>
-          <p:cNvSpPr txBox="1"/>
+          <p:cNvPicPr>
+            <a:picLocks noChangeAspect="1"/>
+          </p:cNvPicPr>
           <p:nvPr/>
-        </p:nvSpPr>
-        <p:spPr>
-          <a:xfrm>
-            <a:off x="6981824" y="3146400"/>
-            <a:ext cx="4391025" cy="2454300"/>
+        </p:nvPicPr>
+        <p:blipFill>
+          <a:blip r:embed="rId3">
+            <a:extLst>
+              <a:ext uri="{28A0092B-C50C-407E-A947-70E740481C1C}">
+                <a14:useLocalDpi xmlns:a14="http://schemas.microsoft.com/office/drawing/2010/main" val="0"/>
+              </a:ext>
+            </a:extLst>
+          </a:blip>
+          <a:stretch>
+            <a:fillRect/>
+          </a:stretch>
+        </p:blipFill>
+        <p:spPr>
+          <a:xfrm>
+            <a:off x="434931" y="166476"/>
+            <a:ext cx="4118017" cy="6359873"/>
           </a:xfrm>
           <a:prstGeom prst="rect">
             <a:avLst/>
           </a:prstGeom>
         </p:spPr>
-        <p:txBody>
-          <a:bodyPr vert="horz" lIns="91440" tIns="45720" rIns="91440" bIns="45720" rtlCol="0">
-            <a:normAutofit/>
-          </a:bodyPr>
-          <a:lstStyle/>
-          <a:p>
-            <a:pPr>
-              <a:lnSpc>
-                <a:spcPct val="90000"/>
-              </a:lnSpc>
-              <a:spcAft>
-                <a:spcPts val="600"/>
-              </a:spcAft>
-            </a:pPr>
-            <a:r>
-              <a:rPr lang="en-US" sz="2400" dirty="0" err="1">
-                <a:solidFill>
-                  <a:schemeClr val="tx1">
-                    <a:alpha val="80000"/>
-                  </a:schemeClr>
-                </a:solidFill>
-                <a:effectLst/>
-              </a:rPr>
-              <a:t>openssl</a:t>
-            </a:r>
-            <a:r>
-              <a:rPr lang="en-US" sz="2400" dirty="0">
-                <a:solidFill>
-                  <a:schemeClr val="tx1">
-                    <a:alpha val="80000"/>
-                  </a:schemeClr>
-                </a:solidFill>
-                <a:effectLst/>
-              </a:rPr>
-              <a:t> req -nodes -new -x509 -</a:t>
-            </a:r>
-            <a:r>
-              <a:rPr lang="en-US" sz="2400" dirty="0" err="1">
-                <a:solidFill>
-                  <a:schemeClr val="tx1">
-                    <a:alpha val="80000"/>
-                  </a:schemeClr>
-                </a:solidFill>
-                <a:effectLst/>
-              </a:rPr>
-              <a:t>keyout</a:t>
-            </a:r>
-            <a:r>
-              <a:rPr lang="en-US" sz="2400" dirty="0">
-                <a:solidFill>
-                  <a:schemeClr val="tx1">
-                    <a:alpha val="80000"/>
-                  </a:schemeClr>
-                </a:solidFill>
-                <a:effectLst/>
-              </a:rPr>
-              <a:t> </a:t>
-            </a:r>
-            <a:r>
-              <a:rPr lang="en-US" sz="2400" dirty="0" err="1">
-                <a:solidFill>
-                  <a:schemeClr val="tx1">
-                    <a:alpha val="80000"/>
-                  </a:schemeClr>
-                </a:solidFill>
-                <a:effectLst/>
-              </a:rPr>
-              <a:t>server.key</a:t>
-            </a:r>
-            <a:r>
-              <a:rPr lang="en-US" sz="2400" dirty="0">
-                <a:solidFill>
-                  <a:schemeClr val="tx1">
-                    <a:alpha val="80000"/>
-                  </a:schemeClr>
-                </a:solidFill>
-                <a:effectLst/>
-              </a:rPr>
-              <a:t> -out </a:t>
-            </a:r>
-            <a:r>
-              <a:rPr lang="en-US" sz="2400" dirty="0" err="1">
-                <a:solidFill>
-                  <a:schemeClr val="tx1">
-                    <a:alpha val="80000"/>
-                  </a:schemeClr>
-                </a:solidFill>
-                <a:effectLst/>
-              </a:rPr>
-              <a:t>server.cert</a:t>
-            </a:r>
-            <a:endParaRPr lang="en-US" sz="2400" dirty="0">
-              <a:solidFill>
-                <a:schemeClr val="tx1">
-                  <a:alpha val="80000"/>
-                </a:schemeClr>
-              </a:solidFill>
-              <a:effectLst/>
-            </a:endParaRPr>
-          </a:p>
-          <a:p>
-            <a:pPr indent="-228600">
-              <a:lnSpc>
-                <a:spcPct val="90000"/>
-              </a:lnSpc>
-              <a:spcAft>
-                <a:spcPts val="600"/>
-              </a:spcAft>
-              <a:buFont typeface="Arial" panose="020B0604020202020204" pitchFamily="34" charset="0"/>
-              <a:buChar char="•"/>
-            </a:pPr>
-            <a:endParaRPr lang="en-US" sz="2400" dirty="0">
-              <a:solidFill>
-                <a:schemeClr val="bg1">
-                  <a:alpha val="80000"/>
-                </a:schemeClr>
-              </a:solidFill>
-            </a:endParaRPr>
-          </a:p>
-        </p:txBody>
-      </p:sp>
+      </p:pic>
+      <p:pic>
+        <p:nvPicPr>
+          <p:cNvPr id="6" name="Image 5" descr="Une image contenant texte, capture d’écran, Police, nombre&#10;&#10;Description générée automatiquement">
+            <a:extLst>
+              <a:ext uri="{FF2B5EF4-FFF2-40B4-BE49-F238E27FC236}">
+                <a16:creationId xmlns:a16="http://schemas.microsoft.com/office/drawing/2014/main" id="{19E261EC-00B5-F5F7-C5A8-59CA51CC1583}"/>
+              </a:ext>
+            </a:extLst>
+          </p:cNvPr>
+          <p:cNvPicPr>
+            <a:picLocks noChangeAspect="1"/>
+          </p:cNvPicPr>
+          <p:nvPr/>
+        </p:nvPicPr>
+        <p:blipFill>
+          <a:blip r:embed="rId4">
+            <a:extLst>
+              <a:ext uri="{28A0092B-C50C-407E-A947-70E740481C1C}">
+                <a14:useLocalDpi xmlns:a14="http://schemas.microsoft.com/office/drawing/2010/main" val="0"/>
+              </a:ext>
+            </a:extLst>
+          </a:blip>
+          <a:stretch>
+            <a:fillRect/>
+          </a:stretch>
+        </p:blipFill>
+        <p:spPr>
+          <a:xfrm>
+            <a:off x="7604536" y="2083883"/>
+            <a:ext cx="3977952" cy="2417096"/>
+          </a:xfrm>
+          <a:prstGeom prst="rect">
+            <a:avLst/>
+          </a:prstGeom>
+        </p:spPr>
+      </p:pic>
     </p:spTree>
     <p:extLst>
       <p:ext uri="{BB962C8B-B14F-4D97-AF65-F5344CB8AC3E}">
-        <p14:creationId xmlns:p14="http://schemas.microsoft.com/office/powerpoint/2010/main" val="2701463037"/>
+        <p14:creationId xmlns:p14="http://schemas.microsoft.com/office/powerpoint/2010/main" val="3625961377"/>
       </p:ext>
     </p:extLst>
   </p:cSld>
@@ -4335,7 +4348,7 @@
           <p:cNvPr id="2" name="Titre 1">
             <a:extLst>
               <a:ext uri="{FF2B5EF4-FFF2-40B4-BE49-F238E27FC236}">
-                <a16:creationId xmlns:a16="http://schemas.microsoft.com/office/drawing/2014/main" id="{651FBEEA-EC75-AF80-35CD-FEE3CEF2043F}"/>
+                <a16:creationId xmlns:a16="http://schemas.microsoft.com/office/drawing/2014/main" id="{1226748C-410A-1879-5299-BC3F19D6B205}"/>
               </a:ext>
             </a:extLst>
           </p:cNvPr>
@@ -4348,12 +4361,12 @@
         </p:nvSpPr>
         <p:spPr>
           <a:xfrm>
-            <a:off x="7639052" y="734140"/>
-            <a:ext cx="3943436" cy="712522"/>
-          </a:xfrm>
-        </p:spPr>
-        <p:txBody>
-          <a:bodyPr anchor="b">
+            <a:off x="1295400" y="669925"/>
+            <a:ext cx="4800600" cy="1325563"/>
+          </a:xfrm>
+        </p:spPr>
+        <p:txBody>
+          <a:bodyPr vert="horz" lIns="91440" tIns="45720" rIns="91440" bIns="45720" rtlCol="0" anchor="b">
             <a:normAutofit/>
           </a:bodyPr>
           <a:lstStyle/>
@@ -4364,17 +4377,17 @@
                   <a:schemeClr val="tx1"/>
                 </a:solidFill>
               </a:rPr>
-              <a:t>Modèle</a:t>
+              <a:t>Authentification</a:t>
             </a:r>
           </a:p>
         </p:txBody>
       </p:sp>
       <p:pic>
         <p:nvPicPr>
-          <p:cNvPr id="5" name="Image 4" descr="Une image contenant texte, capture d’écran, logiciel, Police&#10;&#10;Description générée automatiquement">
+          <p:cNvPr id="5" name="Image 4" descr="Une image contenant texte, capture d’écran, logiciel, affichage&#10;&#10;Description générée automatiquement">
             <a:extLst>
               <a:ext uri="{FF2B5EF4-FFF2-40B4-BE49-F238E27FC236}">
-                <a16:creationId xmlns:a16="http://schemas.microsoft.com/office/drawing/2014/main" id="{86B6D739-AC81-4103-06DA-605FCA9A8F3B}"/>
+                <a16:creationId xmlns:a16="http://schemas.microsoft.com/office/drawing/2014/main" id="{9456160A-714B-02CE-D34F-9ED8A372ED8D}"/>
               </a:ext>
             </a:extLst>
           </p:cNvPr>
@@ -4384,21 +4397,15 @@
           <p:nvPr/>
         </p:nvPicPr>
         <p:blipFill>
-          <a:blip r:embed="rId2">
-            <a:extLst>
-              <a:ext uri="{28A0092B-C50C-407E-A947-70E740481C1C}">
-                <a14:useLocalDpi xmlns:a14="http://schemas.microsoft.com/office/drawing/2010/main" val="0"/>
-              </a:ext>
-            </a:extLst>
-          </a:blip>
+          <a:blip r:embed="rId2"/>
           <a:stretch>
             <a:fillRect/>
           </a:stretch>
         </p:blipFill>
         <p:spPr>
           <a:xfrm>
-            <a:off x="5139703" y="2190749"/>
-            <a:ext cx="1712612" cy="4253909"/>
+            <a:off x="6096000" y="2775598"/>
+            <a:ext cx="5934743" cy="3412477"/>
           </a:xfrm>
           <a:prstGeom prst="rect">
             <a:avLst/>
@@ -4407,10 +4414,10 @@
       </p:pic>
       <p:pic>
         <p:nvPicPr>
-          <p:cNvPr id="4" name="Espace réservé du contenu 3" descr="Une image contenant texte, capture d’écran&#10;&#10;Description générée automatiquement">
+          <p:cNvPr id="4" name="Espace réservé du contenu 3" descr="Une image contenant texte, Appareils électroniques, capture d’écran, affichage&#10;&#10;Description générée automatiquement">
             <a:extLst>
               <a:ext uri="{FF2B5EF4-FFF2-40B4-BE49-F238E27FC236}">
-                <a16:creationId xmlns:a16="http://schemas.microsoft.com/office/drawing/2014/main" id="{47DEA8A8-69BD-DCCE-2EBF-B4B72BDEF8BE}"/>
+                <a16:creationId xmlns:a16="http://schemas.microsoft.com/office/drawing/2014/main" id="{29D79410-D231-94F0-E8E2-24DA72D8CF91}"/>
               </a:ext>
             </a:extLst>
           </p:cNvPr>
@@ -4420,67 +4427,60 @@
           <p:nvPr/>
         </p:nvPicPr>
         <p:blipFill>
-          <a:blip r:embed="rId3">
-            <a:extLst>
-              <a:ext uri="{28A0092B-C50C-407E-A947-70E740481C1C}">
-                <a14:useLocalDpi xmlns:a14="http://schemas.microsoft.com/office/drawing/2010/main" val="0"/>
-              </a:ext>
-            </a:extLst>
-          </a:blip>
+          <a:blip r:embed="rId3"/>
           <a:stretch>
             <a:fillRect/>
           </a:stretch>
         </p:blipFill>
         <p:spPr>
           <a:xfrm>
-            <a:off x="434931" y="166476"/>
-            <a:ext cx="4118017" cy="6359873"/>
+            <a:off x="489847" y="2221405"/>
+            <a:ext cx="5321018" cy="3950857"/>
           </a:xfrm>
           <a:prstGeom prst="rect">
             <a:avLst/>
           </a:prstGeom>
         </p:spPr>
       </p:pic>
-      <p:pic>
-        <p:nvPicPr>
-          <p:cNvPr id="6" name="Image 5" descr="Une image contenant texte, capture d’écran, Police, nombre&#10;&#10;Description générée automatiquement">
+      <p:sp>
+        <p:nvSpPr>
+          <p:cNvPr id="7" name="ZoneTexte 6">
             <a:extLst>
               <a:ext uri="{FF2B5EF4-FFF2-40B4-BE49-F238E27FC236}">
-                <a16:creationId xmlns:a16="http://schemas.microsoft.com/office/drawing/2014/main" id="{19E261EC-00B5-F5F7-C5A8-59CA51CC1583}"/>
+                <a16:creationId xmlns:a16="http://schemas.microsoft.com/office/drawing/2014/main" id="{426B8190-3B86-F67A-AF9C-371E4109AB9C}"/>
               </a:ext>
             </a:extLst>
           </p:cNvPr>
-          <p:cNvPicPr>
-            <a:picLocks noChangeAspect="1"/>
-          </p:cNvPicPr>
+          <p:cNvSpPr txBox="1"/>
           <p:nvPr/>
-        </p:nvPicPr>
-        <p:blipFill>
-          <a:blip r:embed="rId4">
-            <a:extLst>
-              <a:ext uri="{28A0092B-C50C-407E-A947-70E740481C1C}">
-                <a14:useLocalDpi xmlns:a14="http://schemas.microsoft.com/office/drawing/2010/main" val="0"/>
-              </a:ext>
-            </a:extLst>
-          </a:blip>
-          <a:stretch>
-            <a:fillRect/>
-          </a:stretch>
-        </p:blipFill>
-        <p:spPr>
-          <a:xfrm>
-            <a:off x="8302173" y="4489732"/>
-            <a:ext cx="3217333" cy="1954926"/>
+        </p:nvSpPr>
+        <p:spPr>
+          <a:xfrm>
+            <a:off x="8547990" y="2377998"/>
+            <a:ext cx="873957" cy="369332"/>
           </a:xfrm>
           <a:prstGeom prst="rect">
             <a:avLst/>
           </a:prstGeom>
-        </p:spPr>
-      </p:pic>
+          <a:noFill/>
+        </p:spPr>
+        <p:txBody>
+          <a:bodyPr wrap="none" rtlCol="0">
+            <a:spAutoFit/>
+          </a:bodyPr>
+          <a:lstStyle/>
+          <a:p>
+            <a:r>
+              <a:rPr lang="fr-CH" dirty="0"/>
+              <a:t>Admin</a:t>
+            </a:r>
+          </a:p>
+        </p:txBody>
+      </p:sp>
     </p:spTree>
     <p:extLst>
       <p:ext uri="{BB962C8B-B14F-4D97-AF65-F5344CB8AC3E}">
-        <p14:creationId xmlns:p14="http://schemas.microsoft.com/office/powerpoint/2010/main" val="3625961377"/>
+        <p14:creationId xmlns:p14="http://schemas.microsoft.com/office/powerpoint/2010/main" val="2248539204"/>
       </p:ext>
     </p:extLst>
   </p:cSld>
@@ -4491,6 +4491,260 @@
 </file>
 
 <file path=ppt/slides/slide6.xml><?xml version="1.0" encoding="utf-8"?>
+<p:sld xmlns:a="http://schemas.openxmlformats.org/drawingml/2006/main" xmlns:r="http://schemas.openxmlformats.org/officeDocument/2006/relationships" xmlns:p="http://schemas.openxmlformats.org/presentationml/2006/main">
+  <p:cSld>
+    <p:bg>
+      <p:bgPr>
+        <a:solidFill>
+          <a:schemeClr val="bg1"/>
+        </a:solidFill>
+        <a:effectLst/>
+      </p:bgPr>
+    </p:bg>
+    <p:spTree>
+      <p:nvGrpSpPr>
+        <p:cNvPr id="1" name=""/>
+        <p:cNvGrpSpPr/>
+        <p:nvPr/>
+      </p:nvGrpSpPr>
+      <p:grpSpPr>
+        <a:xfrm>
+          <a:off x="0" y="0"/>
+          <a:ext cx="0" cy="0"/>
+          <a:chOff x="0" y="0"/>
+          <a:chExt cx="0" cy="0"/>
+        </a:xfrm>
+      </p:grpSpPr>
+      <p:sp>
+        <p:nvSpPr>
+          <p:cNvPr id="2" name="Titre 1">
+            <a:extLst>
+              <a:ext uri="{FF2B5EF4-FFF2-40B4-BE49-F238E27FC236}">
+                <a16:creationId xmlns:a16="http://schemas.microsoft.com/office/drawing/2014/main" id="{2B3F0FC3-0F62-A078-0F24-72F4F5D94885}"/>
+              </a:ext>
+            </a:extLst>
+          </p:cNvPr>
+          <p:cNvSpPr>
+            <a:spLocks noGrp="1"/>
+          </p:cNvSpPr>
+          <p:nvPr>
+            <p:ph type="title"/>
+          </p:nvPr>
+        </p:nvSpPr>
+        <p:spPr>
+          <a:xfrm>
+            <a:off x="6981823" y="1641752"/>
+            <a:ext cx="4391025" cy="1323439"/>
+          </a:xfrm>
+        </p:spPr>
+        <p:txBody>
+          <a:bodyPr vert="horz" lIns="91440" tIns="45720" rIns="91440" bIns="45720" rtlCol="0" anchor="t">
+            <a:normAutofit/>
+          </a:bodyPr>
+          <a:lstStyle/>
+          <a:p>
+            <a:r>
+              <a:rPr lang="en-US" sz="4000" kern="1200" dirty="0">
+                <a:solidFill>
+                  <a:schemeClr val="tx1"/>
+                </a:solidFill>
+                <a:latin typeface="+mj-lt"/>
+                <a:ea typeface="+mj-ea"/>
+                <a:cs typeface="+mj-cs"/>
+              </a:rPr>
+              <a:t>HTTPS</a:t>
+            </a:r>
+          </a:p>
+        </p:txBody>
+      </p:sp>
+      <p:pic>
+        <p:nvPicPr>
+          <p:cNvPr id="4" name="Espace réservé du contenu 3" descr="Une image contenant texte, capture d’écran, logiciel, affichage&#10;&#10;Description générée automatiquement">
+            <a:extLst>
+              <a:ext uri="{FF2B5EF4-FFF2-40B4-BE49-F238E27FC236}">
+                <a16:creationId xmlns:a16="http://schemas.microsoft.com/office/drawing/2014/main" id="{16387574-9D8D-C9B3-B017-C3A00ABDEEB9}"/>
+              </a:ext>
+            </a:extLst>
+          </p:cNvPr>
+          <p:cNvPicPr>
+            <a:picLocks noGrp="1" noChangeAspect="1"/>
+          </p:cNvPicPr>
+          <p:nvPr>
+            <p:ph idx="1"/>
+          </p:nvPr>
+        </p:nvPicPr>
+        <p:blipFill>
+          <a:blip r:embed="rId2"/>
+          <a:stretch>
+            <a:fillRect/>
+          </a:stretch>
+        </p:blipFill>
+        <p:spPr>
+          <a:xfrm>
+            <a:off x="514839" y="1966451"/>
+            <a:ext cx="5952145" cy="3422483"/>
+          </a:xfrm>
+          <a:prstGeom prst="rect">
+            <a:avLst/>
+          </a:prstGeom>
+        </p:spPr>
+      </p:pic>
+      <p:sp>
+        <p:nvSpPr>
+          <p:cNvPr id="5" name="ZoneTexte 4">
+            <a:extLst>
+              <a:ext uri="{FF2B5EF4-FFF2-40B4-BE49-F238E27FC236}">
+                <a16:creationId xmlns:a16="http://schemas.microsoft.com/office/drawing/2014/main" id="{833B5714-644F-E26D-6522-5D9CC92E16EC}"/>
+              </a:ext>
+            </a:extLst>
+          </p:cNvPr>
+          <p:cNvSpPr txBox="1"/>
+          <p:nvPr/>
+        </p:nvSpPr>
+        <p:spPr>
+          <a:xfrm>
+            <a:off x="6981824" y="3146400"/>
+            <a:ext cx="4391025" cy="2454300"/>
+          </a:xfrm>
+          <a:prstGeom prst="rect">
+            <a:avLst/>
+          </a:prstGeom>
+        </p:spPr>
+        <p:txBody>
+          <a:bodyPr vert="horz" lIns="91440" tIns="45720" rIns="91440" bIns="45720" rtlCol="0">
+            <a:normAutofit/>
+          </a:bodyPr>
+          <a:lstStyle/>
+          <a:p>
+            <a:pPr>
+              <a:lnSpc>
+                <a:spcPct val="90000"/>
+              </a:lnSpc>
+              <a:spcAft>
+                <a:spcPts val="600"/>
+              </a:spcAft>
+            </a:pPr>
+            <a:r>
+              <a:rPr lang="en-US" sz="2400" dirty="0" err="1">
+                <a:solidFill>
+                  <a:schemeClr val="tx1">
+                    <a:alpha val="80000"/>
+                  </a:schemeClr>
+                </a:solidFill>
+                <a:effectLst/>
+              </a:rPr>
+              <a:t>openssl</a:t>
+            </a:r>
+            <a:r>
+              <a:rPr lang="en-US" sz="2400" dirty="0">
+                <a:solidFill>
+                  <a:schemeClr val="tx1">
+                    <a:alpha val="80000"/>
+                  </a:schemeClr>
+                </a:solidFill>
+                <a:effectLst/>
+              </a:rPr>
+              <a:t> req -nodes -new -x509 -</a:t>
+            </a:r>
+            <a:r>
+              <a:rPr lang="en-US" sz="2400" dirty="0" err="1">
+                <a:solidFill>
+                  <a:schemeClr val="tx1">
+                    <a:alpha val="80000"/>
+                  </a:schemeClr>
+                </a:solidFill>
+                <a:effectLst/>
+              </a:rPr>
+              <a:t>keyout</a:t>
+            </a:r>
+            <a:r>
+              <a:rPr lang="en-US" sz="2400" dirty="0">
+                <a:solidFill>
+                  <a:schemeClr val="tx1">
+                    <a:alpha val="80000"/>
+                  </a:schemeClr>
+                </a:solidFill>
+                <a:effectLst/>
+              </a:rPr>
+              <a:t> </a:t>
+            </a:r>
+            <a:r>
+              <a:rPr lang="en-US" sz="2400" dirty="0" err="1">
+                <a:solidFill>
+                  <a:schemeClr val="tx1">
+                    <a:alpha val="80000"/>
+                  </a:schemeClr>
+                </a:solidFill>
+                <a:effectLst/>
+              </a:rPr>
+              <a:t>server.key</a:t>
+            </a:r>
+            <a:r>
+              <a:rPr lang="en-US" sz="2400" dirty="0">
+                <a:solidFill>
+                  <a:schemeClr val="tx1">
+                    <a:alpha val="80000"/>
+                  </a:schemeClr>
+                </a:solidFill>
+                <a:effectLst/>
+              </a:rPr>
+              <a:t> -out </a:t>
+            </a:r>
+            <a:r>
+              <a:rPr lang="en-US" sz="2400" dirty="0" err="1">
+                <a:solidFill>
+                  <a:schemeClr val="tx1">
+                    <a:alpha val="80000"/>
+                  </a:schemeClr>
+                </a:solidFill>
+                <a:effectLst/>
+              </a:rPr>
+              <a:t>server.cert</a:t>
+            </a:r>
+            <a:endParaRPr lang="en-US" sz="2400" dirty="0">
+              <a:solidFill>
+                <a:schemeClr val="tx1">
+                  <a:alpha val="80000"/>
+                </a:schemeClr>
+              </a:solidFill>
+              <a:effectLst/>
+            </a:endParaRPr>
+          </a:p>
+          <a:p>
+            <a:pPr indent="-228600">
+              <a:lnSpc>
+                <a:spcPct val="90000"/>
+              </a:lnSpc>
+              <a:spcAft>
+                <a:spcPts val="600"/>
+              </a:spcAft>
+              <a:buFont typeface="Arial" panose="020B0604020202020204" pitchFamily="34" charset="0"/>
+              <a:buChar char="•"/>
+            </a:pPr>
+            <a:endParaRPr lang="en-US" sz="2400" dirty="0">
+              <a:solidFill>
+                <a:schemeClr val="bg1">
+                  <a:alpha val="80000"/>
+                </a:schemeClr>
+              </a:solidFill>
+            </a:endParaRPr>
+          </a:p>
+        </p:txBody>
+      </p:sp>
+    </p:spTree>
+    <p:extLst>
+      <p:ext uri="{BB962C8B-B14F-4D97-AF65-F5344CB8AC3E}">
+        <p14:creationId xmlns:p14="http://schemas.microsoft.com/office/powerpoint/2010/main" val="2701463037"/>
+      </p:ext>
+    </p:extLst>
+  </p:cSld>
+  <p:clrMapOvr>
+    <a:masterClrMapping/>
+  </p:clrMapOvr>
+</p:sld>
+</file>
+
+<file path=ppt/slides/slide7.xml><?xml version="1.0" encoding="utf-8"?>
 <p:sld xmlns:a="http://schemas.openxmlformats.org/drawingml/2006/main" xmlns:r="http://schemas.openxmlformats.org/officeDocument/2006/relationships" xmlns:p="http://schemas.openxmlformats.org/presentationml/2006/main">
   <p:cSld>
     <p:bg>
@@ -4947,156 +5201,6 @@
 </p:sld>
 </file>
 
-<file path=ppt/slides/slide7.xml><?xml version="1.0" encoding="utf-8"?>
-<p:sld xmlns:a="http://schemas.openxmlformats.org/drawingml/2006/main" xmlns:r="http://schemas.openxmlformats.org/officeDocument/2006/relationships" xmlns:p="http://schemas.openxmlformats.org/presentationml/2006/main">
-  <p:cSld>
-    <p:spTree>
-      <p:nvGrpSpPr>
-        <p:cNvPr id="1" name=""/>
-        <p:cNvGrpSpPr/>
-        <p:nvPr/>
-      </p:nvGrpSpPr>
-      <p:grpSpPr>
-        <a:xfrm>
-          <a:off x="0" y="0"/>
-          <a:ext cx="0" cy="0"/>
-          <a:chOff x="0" y="0"/>
-          <a:chExt cx="0" cy="0"/>
-        </a:xfrm>
-      </p:grpSpPr>
-      <p:sp>
-        <p:nvSpPr>
-          <p:cNvPr id="2" name="Titre 1">
-            <a:extLst>
-              <a:ext uri="{FF2B5EF4-FFF2-40B4-BE49-F238E27FC236}">
-                <a16:creationId xmlns:a16="http://schemas.microsoft.com/office/drawing/2014/main" id="{7D3B5775-3CC2-2C46-46CD-FB3AC1004955}"/>
-              </a:ext>
-            </a:extLst>
-          </p:cNvPr>
-          <p:cNvSpPr>
-            <a:spLocks noGrp="1"/>
-          </p:cNvSpPr>
-          <p:nvPr>
-            <p:ph type="title"/>
-          </p:nvPr>
-        </p:nvSpPr>
-        <p:spPr/>
-        <p:txBody>
-          <a:bodyPr/>
-          <a:lstStyle/>
-          <a:p>
-            <a:r>
-              <a:rPr lang="fr-CH" dirty="0"/>
-              <a:t>Contrôleurs</a:t>
-            </a:r>
-          </a:p>
-        </p:txBody>
-      </p:sp>
-      <p:pic>
-        <p:nvPicPr>
-          <p:cNvPr id="5" name="Espace réservé du contenu 4" descr="Une image contenant texte, capture d’écran&#10;&#10;Description générée automatiquement">
-            <a:extLst>
-              <a:ext uri="{FF2B5EF4-FFF2-40B4-BE49-F238E27FC236}">
-                <a16:creationId xmlns:a16="http://schemas.microsoft.com/office/drawing/2014/main" id="{E6C06072-33E0-4315-C9BF-792C86151B40}"/>
-              </a:ext>
-            </a:extLst>
-          </p:cNvPr>
-          <p:cNvPicPr>
-            <a:picLocks noGrp="1" noChangeAspect="1"/>
-          </p:cNvPicPr>
-          <p:nvPr>
-            <p:ph idx="1"/>
-          </p:nvPr>
-        </p:nvPicPr>
-        <p:blipFill>
-          <a:blip r:embed="rId2"/>
-          <a:stretch>
-            <a:fillRect/>
-          </a:stretch>
-        </p:blipFill>
-        <p:spPr>
-          <a:xfrm>
-            <a:off x="6925050" y="434992"/>
-            <a:ext cx="3876675" cy="5988015"/>
-          </a:xfrm>
-          <a:prstGeom prst="rect">
-            <a:avLst/>
-          </a:prstGeom>
-        </p:spPr>
-      </p:pic>
-      <p:pic>
-        <p:nvPicPr>
-          <p:cNvPr id="6" name="Image 5" descr="Une image contenant texte, capture d’écran, Police&#10;&#10;Description générée automatiquement">
-            <a:extLst>
-              <a:ext uri="{FF2B5EF4-FFF2-40B4-BE49-F238E27FC236}">
-                <a16:creationId xmlns:a16="http://schemas.microsoft.com/office/drawing/2014/main" id="{6C7342A6-61CA-70F5-DB26-9764A1AF2B46}"/>
-              </a:ext>
-            </a:extLst>
-          </p:cNvPr>
-          <p:cNvPicPr>
-            <a:picLocks noChangeAspect="1"/>
-          </p:cNvPicPr>
-          <p:nvPr/>
-        </p:nvPicPr>
-        <p:blipFill>
-          <a:blip r:embed="rId3"/>
-          <a:stretch>
-            <a:fillRect/>
-          </a:stretch>
-        </p:blipFill>
-        <p:spPr>
-          <a:xfrm>
-            <a:off x="962410" y="1491776"/>
-            <a:ext cx="3876675" cy="1762125"/>
-          </a:xfrm>
-          <a:prstGeom prst="rect">
-            <a:avLst/>
-          </a:prstGeom>
-        </p:spPr>
-      </p:pic>
-      <p:pic>
-        <p:nvPicPr>
-          <p:cNvPr id="7" name="Image 6" descr="Une image contenant texte, capture d’écran, logiciel&#10;&#10;Description générée automatiquement">
-            <a:extLst>
-              <a:ext uri="{FF2B5EF4-FFF2-40B4-BE49-F238E27FC236}">
-                <a16:creationId xmlns:a16="http://schemas.microsoft.com/office/drawing/2014/main" id="{5A951063-0733-398F-841C-EF7BF42726AD}"/>
-              </a:ext>
-            </a:extLst>
-          </p:cNvPr>
-          <p:cNvPicPr>
-            <a:picLocks noChangeAspect="1"/>
-          </p:cNvPicPr>
-          <p:nvPr/>
-        </p:nvPicPr>
-        <p:blipFill>
-          <a:blip r:embed="rId4"/>
-          <a:stretch>
-            <a:fillRect/>
-          </a:stretch>
-        </p:blipFill>
-        <p:spPr>
-          <a:xfrm>
-            <a:off x="1019560" y="3429000"/>
-            <a:ext cx="3819525" cy="2971800"/>
-          </a:xfrm>
-          <a:prstGeom prst="rect">
-            <a:avLst/>
-          </a:prstGeom>
-        </p:spPr>
-      </p:pic>
-    </p:spTree>
-    <p:extLst>
-      <p:ext uri="{BB962C8B-B14F-4D97-AF65-F5344CB8AC3E}">
-        <p14:creationId xmlns:p14="http://schemas.microsoft.com/office/powerpoint/2010/main" val="909899131"/>
-      </p:ext>
-    </p:extLst>
-  </p:cSld>
-  <p:clrMapOvr>
-    <a:masterClrMapping/>
-  </p:clrMapOvr>
-</p:sld>
-</file>
-
 <file path=ppt/slides/slide8.xml><?xml version="1.0" encoding="utf-8"?>
 <p:sld xmlns:a="http://schemas.openxmlformats.org/drawingml/2006/main" xmlns:r="http://schemas.openxmlformats.org/officeDocument/2006/relationships" xmlns:p="http://schemas.openxmlformats.org/presentationml/2006/main">
   <p:cSld>
@@ -5119,7 +5223,7 @@
           <p:cNvPr id="2" name="Titre 1">
             <a:extLst>
               <a:ext uri="{FF2B5EF4-FFF2-40B4-BE49-F238E27FC236}">
-                <a16:creationId xmlns:a16="http://schemas.microsoft.com/office/drawing/2014/main" id="{BDDE618E-C75F-8D36-CCF5-50E2C54BC80B}"/>
+                <a16:creationId xmlns:a16="http://schemas.microsoft.com/office/drawing/2014/main" id="{57D3644A-F5C2-DDCB-7AA9-1A79313D7E48}"/>
               </a:ext>
             </a:extLst>
           </p:cNvPr>
@@ -5137,17 +5241,17 @@
           <a:p>
             <a:r>
               <a:rPr lang="fr-CH" dirty="0"/>
-              <a:t>Contrôleurs</a:t>
+              <a:t>Routes</a:t>
             </a:r>
           </a:p>
         </p:txBody>
       </p:sp>
       <p:pic>
         <p:nvPicPr>
-          <p:cNvPr id="4" name="Espace réservé du contenu 3" descr="Une image contenant texte, capture d’écran, logiciel&#10;&#10;Description générée automatiquement">
+          <p:cNvPr id="6" name="Espace réservé du contenu 5" descr="Une image contenant texte, capture d’écran, Police&#10;&#10;Description générée automatiquement">
             <a:extLst>
               <a:ext uri="{FF2B5EF4-FFF2-40B4-BE49-F238E27FC236}">
-                <a16:creationId xmlns:a16="http://schemas.microsoft.com/office/drawing/2014/main" id="{9B458C83-9A41-DA32-68C2-04972F8B64D1}"/>
+                <a16:creationId xmlns:a16="http://schemas.microsoft.com/office/drawing/2014/main" id="{8E8F7BDC-9E58-8251-659C-50894A7EF5C0}"/>
               </a:ext>
             </a:extLst>
           </p:cNvPr>
@@ -5166,8 +5270,8 @@
         </p:blipFill>
         <p:spPr>
           <a:xfrm>
-            <a:off x="4478912" y="940406"/>
-            <a:ext cx="7157890" cy="5440938"/>
+            <a:off x="2893602" y="2486730"/>
+            <a:ext cx="5626504" cy="1884540"/>
           </a:xfrm>
           <a:prstGeom prst="rect">
             <a:avLst/>
@@ -5177,7 +5281,7 @@
     </p:spTree>
     <p:extLst>
       <p:ext uri="{BB962C8B-B14F-4D97-AF65-F5344CB8AC3E}">
-        <p14:creationId xmlns:p14="http://schemas.microsoft.com/office/powerpoint/2010/main" val="1169907791"/>
+        <p14:creationId xmlns:p14="http://schemas.microsoft.com/office/powerpoint/2010/main" val="1140377945"/>
       </p:ext>
     </p:extLst>
   </p:cSld>
@@ -5209,7 +5313,7 @@
           <p:cNvPr id="2" name="Titre 1">
             <a:extLst>
               <a:ext uri="{FF2B5EF4-FFF2-40B4-BE49-F238E27FC236}">
-                <a16:creationId xmlns:a16="http://schemas.microsoft.com/office/drawing/2014/main" id="{57D3644A-F5C2-DDCB-7AA9-1A79313D7E48}"/>
+                <a16:creationId xmlns:a16="http://schemas.microsoft.com/office/drawing/2014/main" id="{7D3B5775-3CC2-2C46-46CD-FB3AC1004955}"/>
               </a:ext>
             </a:extLst>
           </p:cNvPr>
@@ -5227,17 +5331,17 @@
           <a:p>
             <a:r>
               <a:rPr lang="fr-CH" dirty="0"/>
-              <a:t>Routes</a:t>
+              <a:t>Contrôleurs</a:t>
             </a:r>
           </a:p>
         </p:txBody>
       </p:sp>
       <p:pic>
         <p:nvPicPr>
-          <p:cNvPr id="6" name="Espace réservé du contenu 5" descr="Une image contenant texte, capture d’écran, Police&#10;&#10;Description générée automatiquement">
+          <p:cNvPr id="5" name="Espace réservé du contenu 4" descr="Une image contenant texte, capture d’écran&#10;&#10;Description générée automatiquement">
             <a:extLst>
               <a:ext uri="{FF2B5EF4-FFF2-40B4-BE49-F238E27FC236}">
-                <a16:creationId xmlns:a16="http://schemas.microsoft.com/office/drawing/2014/main" id="{8E8F7BDC-9E58-8251-659C-50894A7EF5C0}"/>
+                <a16:creationId xmlns:a16="http://schemas.microsoft.com/office/drawing/2014/main" id="{E6C06072-33E0-4315-C9BF-792C86151B40}"/>
               </a:ext>
             </a:extLst>
           </p:cNvPr>
@@ -5256,8 +5360,68 @@
         </p:blipFill>
         <p:spPr>
           <a:xfrm>
-            <a:off x="2893602" y="2486730"/>
-            <a:ext cx="5626504" cy="1884540"/>
+            <a:off x="6925050" y="434992"/>
+            <a:ext cx="3876675" cy="5988015"/>
+          </a:xfrm>
+          <a:prstGeom prst="rect">
+            <a:avLst/>
+          </a:prstGeom>
+        </p:spPr>
+      </p:pic>
+      <p:pic>
+        <p:nvPicPr>
+          <p:cNvPr id="6" name="Image 5" descr="Une image contenant texte, capture d’écran, Police&#10;&#10;Description générée automatiquement">
+            <a:extLst>
+              <a:ext uri="{FF2B5EF4-FFF2-40B4-BE49-F238E27FC236}">
+                <a16:creationId xmlns:a16="http://schemas.microsoft.com/office/drawing/2014/main" id="{6C7342A6-61CA-70F5-DB26-9764A1AF2B46}"/>
+              </a:ext>
+            </a:extLst>
+          </p:cNvPr>
+          <p:cNvPicPr>
+            <a:picLocks noChangeAspect="1"/>
+          </p:cNvPicPr>
+          <p:nvPr/>
+        </p:nvPicPr>
+        <p:blipFill>
+          <a:blip r:embed="rId3"/>
+          <a:stretch>
+            <a:fillRect/>
+          </a:stretch>
+        </p:blipFill>
+        <p:spPr>
+          <a:xfrm>
+            <a:off x="962410" y="1491776"/>
+            <a:ext cx="3876675" cy="1762125"/>
+          </a:xfrm>
+          <a:prstGeom prst="rect">
+            <a:avLst/>
+          </a:prstGeom>
+        </p:spPr>
+      </p:pic>
+      <p:pic>
+        <p:nvPicPr>
+          <p:cNvPr id="7" name="Image 6" descr="Une image contenant texte, capture d’écran, logiciel&#10;&#10;Description générée automatiquement">
+            <a:extLst>
+              <a:ext uri="{FF2B5EF4-FFF2-40B4-BE49-F238E27FC236}">
+                <a16:creationId xmlns:a16="http://schemas.microsoft.com/office/drawing/2014/main" id="{5A951063-0733-398F-841C-EF7BF42726AD}"/>
+              </a:ext>
+            </a:extLst>
+          </p:cNvPr>
+          <p:cNvPicPr>
+            <a:picLocks noChangeAspect="1"/>
+          </p:cNvPicPr>
+          <p:nvPr/>
+        </p:nvPicPr>
+        <p:blipFill>
+          <a:blip r:embed="rId4"/>
+          <a:stretch>
+            <a:fillRect/>
+          </a:stretch>
+        </p:blipFill>
+        <p:spPr>
+          <a:xfrm>
+            <a:off x="1019560" y="3429000"/>
+            <a:ext cx="3819525" cy="2971800"/>
           </a:xfrm>
           <a:prstGeom prst="rect">
             <a:avLst/>
@@ -5267,7 +5431,7 @@
     </p:spTree>
     <p:extLst>
       <p:ext uri="{BB962C8B-B14F-4D97-AF65-F5344CB8AC3E}">
-        <p14:creationId xmlns:p14="http://schemas.microsoft.com/office/powerpoint/2010/main" val="1140377945"/>
+        <p14:creationId xmlns:p14="http://schemas.microsoft.com/office/powerpoint/2010/main" val="909899131"/>
       </p:ext>
     </p:extLst>
   </p:cSld>

</xml_diff>